<commit_message>
Added legend to infoFlow.pptx
</commit_message>
<xml_diff>
--- a/Docs/InfoFlow/infoFlow.pptx
+++ b/Docs/InfoFlow/infoFlow.pptx
@@ -3834,7 +3834,7 @@
         </p:nvSpPr>
         <p:spPr>
           <a:xfrm>
-            <a:off x="5806440" y="1277836"/>
+            <a:off x="5806440" y="1940776"/>
             <a:ext cx="679994" cy="646331"/>
           </a:xfrm>
           <a:prstGeom prst="rect">
@@ -3887,7 +3887,7 @@
         </p:nvSpPr>
         <p:spPr>
           <a:xfrm>
-            <a:off x="5695031" y="2243760"/>
+            <a:off x="5695031" y="2906700"/>
             <a:ext cx="902811" cy="646331"/>
           </a:xfrm>
           <a:prstGeom prst="rect">
@@ -3940,7 +3940,7 @@
         </p:nvSpPr>
         <p:spPr>
           <a:xfrm>
-            <a:off x="5733502" y="3230849"/>
+            <a:off x="5733502" y="3893789"/>
             <a:ext cx="825867" cy="646331"/>
           </a:xfrm>
           <a:prstGeom prst="rect">
@@ -3976,6 +3976,93 @@
               <a:rPr lang="en-US" dirty="0"/>
               <a:t>file</a:t>
             </a:r>
+          </a:p>
+        </p:txBody>
+      </p:sp>
+      <p:sp>
+        <p:nvSpPr>
+          <p:cNvPr id="2" name="TextBox 1">
+            <a:extLst>
+              <a:ext uri="{FF2B5EF4-FFF2-40B4-BE49-F238E27FC236}">
+                <a16:creationId xmlns:a16="http://schemas.microsoft.com/office/drawing/2014/main" id="{E9ED95C9-066D-BE49-95B2-BAD812934AF9}"/>
+              </a:ext>
+            </a:extLst>
+          </p:cNvPr>
+          <p:cNvSpPr txBox="1"/>
+          <p:nvPr/>
+        </p:nvSpPr>
+        <p:spPr>
+          <a:xfrm>
+            <a:off x="5646420" y="1520190"/>
+            <a:ext cx="581378" cy="369332"/>
+          </a:xfrm>
+          <a:prstGeom prst="rect">
+            <a:avLst/>
+          </a:prstGeom>
+          <a:noFill/>
+        </p:spPr>
+        <p:txBody>
+          <a:bodyPr wrap="none" rtlCol="0">
+            <a:spAutoFit/>
+          </a:bodyPr>
+          <a:lstStyle/>
+          <a:p>
+            <a:r>
+              <a:rPr lang="en-US" dirty="0"/>
+              <a:t>Key:</a:t>
+            </a:r>
+          </a:p>
+        </p:txBody>
+      </p:sp>
+      <p:sp>
+        <p:nvSpPr>
+          <p:cNvPr id="10" name="Rectangle 9">
+            <a:extLst>
+              <a:ext uri="{FF2B5EF4-FFF2-40B4-BE49-F238E27FC236}">
+                <a16:creationId xmlns:a16="http://schemas.microsoft.com/office/drawing/2014/main" id="{E16AB50F-4F03-5942-9E94-ABF58619A7E8}"/>
+              </a:ext>
+            </a:extLst>
+          </p:cNvPr>
+          <p:cNvSpPr/>
+          <p:nvPr/>
+        </p:nvSpPr>
+        <p:spPr>
+          <a:xfrm>
+            <a:off x="5608820" y="1520190"/>
+            <a:ext cx="1100590" cy="3173698"/>
+          </a:xfrm>
+          <a:prstGeom prst="rect">
+            <a:avLst/>
+          </a:prstGeom>
+          <a:noFill/>
+          <a:ln w="28575">
+            <a:solidFill>
+              <a:schemeClr val="accent1"/>
+            </a:solidFill>
+          </a:ln>
+        </p:spPr>
+        <p:style>
+          <a:lnRef idx="2">
+            <a:schemeClr val="accent1">
+              <a:shade val="50000"/>
+            </a:schemeClr>
+          </a:lnRef>
+          <a:fillRef idx="1">
+            <a:schemeClr val="accent1"/>
+          </a:fillRef>
+          <a:effectRef idx="0">
+            <a:schemeClr val="accent1"/>
+          </a:effectRef>
+          <a:fontRef idx="minor">
+            <a:schemeClr val="lt1"/>
+          </a:fontRef>
+        </p:style>
+        <p:txBody>
+          <a:bodyPr rtlCol="0" anchor="ctr"/>
+          <a:lstStyle/>
+          <a:p>
+            <a:pPr algn="ctr"/>
+            <a:endParaRPr lang="en-US"/>
           </a:p>
         </p:txBody>
       </p:sp>

</xml_diff>

<commit_message>
Updated infoFlow.pptx and infoFlow.pdf to include Fit Input File
</commit_message>
<xml_diff>
--- a/Docs/InfoFlow/infoFlow.pptx
+++ b/Docs/InfoFlow/infoFlow.pptx
@@ -243,7 +243,7 @@
           <a:p>
             <a:fld id="{80AD12E7-5618-F84C-9883-D00C1B927FE3}" type="datetimeFigureOut">
               <a:rPr lang="en-US" smtClean="0"/>
-              <a:t>7/20/19</a:t>
+              <a:t>7/27/19</a:t>
             </a:fld>
             <a:endParaRPr lang="en-US"/>
           </a:p>
@@ -413,7 +413,7 @@
           <a:p>
             <a:fld id="{80AD12E7-5618-F84C-9883-D00C1B927FE3}" type="datetimeFigureOut">
               <a:rPr lang="en-US" smtClean="0"/>
-              <a:t>7/20/19</a:t>
+              <a:t>7/27/19</a:t>
             </a:fld>
             <a:endParaRPr lang="en-US"/>
           </a:p>
@@ -593,7 +593,7 @@
           <a:p>
             <a:fld id="{80AD12E7-5618-F84C-9883-D00C1B927FE3}" type="datetimeFigureOut">
               <a:rPr lang="en-US" smtClean="0"/>
-              <a:t>7/20/19</a:t>
+              <a:t>7/27/19</a:t>
             </a:fld>
             <a:endParaRPr lang="en-US"/>
           </a:p>
@@ -763,7 +763,7 @@
           <a:p>
             <a:fld id="{80AD12E7-5618-F84C-9883-D00C1B927FE3}" type="datetimeFigureOut">
               <a:rPr lang="en-US" smtClean="0"/>
-              <a:t>7/20/19</a:t>
+              <a:t>7/27/19</a:t>
             </a:fld>
             <a:endParaRPr lang="en-US"/>
           </a:p>
@@ -1007,7 +1007,7 @@
           <a:p>
             <a:fld id="{80AD12E7-5618-F84C-9883-D00C1B927FE3}" type="datetimeFigureOut">
               <a:rPr lang="en-US" smtClean="0"/>
-              <a:t>7/20/19</a:t>
+              <a:t>7/27/19</a:t>
             </a:fld>
             <a:endParaRPr lang="en-US"/>
           </a:p>
@@ -1239,7 +1239,7 @@
           <a:p>
             <a:fld id="{80AD12E7-5618-F84C-9883-D00C1B927FE3}" type="datetimeFigureOut">
               <a:rPr lang="en-US" smtClean="0"/>
-              <a:t>7/20/19</a:t>
+              <a:t>7/27/19</a:t>
             </a:fld>
             <a:endParaRPr lang="en-US"/>
           </a:p>
@@ -1606,7 +1606,7 @@
           <a:p>
             <a:fld id="{80AD12E7-5618-F84C-9883-D00C1B927FE3}" type="datetimeFigureOut">
               <a:rPr lang="en-US" smtClean="0"/>
-              <a:t>7/20/19</a:t>
+              <a:t>7/27/19</a:t>
             </a:fld>
             <a:endParaRPr lang="en-US"/>
           </a:p>
@@ -1724,7 +1724,7 @@
           <a:p>
             <a:fld id="{80AD12E7-5618-F84C-9883-D00C1B927FE3}" type="datetimeFigureOut">
               <a:rPr lang="en-US" smtClean="0"/>
-              <a:t>7/20/19</a:t>
+              <a:t>7/27/19</a:t>
             </a:fld>
             <a:endParaRPr lang="en-US"/>
           </a:p>
@@ -1819,7 +1819,7 @@
           <a:p>
             <a:fld id="{80AD12E7-5618-F84C-9883-D00C1B927FE3}" type="datetimeFigureOut">
               <a:rPr lang="en-US" smtClean="0"/>
-              <a:t>7/20/19</a:t>
+              <a:t>7/27/19</a:t>
             </a:fld>
             <a:endParaRPr lang="en-US"/>
           </a:p>
@@ -2096,7 +2096,7 @@
           <a:p>
             <a:fld id="{80AD12E7-5618-F84C-9883-D00C1B927FE3}" type="datetimeFigureOut">
               <a:rPr lang="en-US" smtClean="0"/>
-              <a:t>7/20/19</a:t>
+              <a:t>7/27/19</a:t>
             </a:fld>
             <a:endParaRPr lang="en-US"/>
           </a:p>
@@ -2353,7 +2353,7 @@
           <a:p>
             <a:fld id="{80AD12E7-5618-F84C-9883-D00C1B927FE3}" type="datetimeFigureOut">
               <a:rPr lang="en-US" smtClean="0"/>
-              <a:t>7/20/19</a:t>
+              <a:t>7/27/19</a:t>
             </a:fld>
             <a:endParaRPr lang="en-US"/>
           </a:p>
@@ -2566,7 +2566,7 @@
           <a:p>
             <a:fld id="{80AD12E7-5618-F84C-9883-D00C1B927FE3}" type="datetimeFigureOut">
               <a:rPr lang="en-US" smtClean="0"/>
-              <a:t>7/20/19</a:t>
+              <a:t>7/27/19</a:t>
             </a:fld>
             <a:endParaRPr lang="en-US"/>
           </a:p>
@@ -2985,7 +2985,7 @@
         </p:nvSpPr>
         <p:spPr>
           <a:xfrm>
-            <a:off x="259080" y="1336148"/>
+            <a:off x="76200" y="1336148"/>
             <a:ext cx="2171877" cy="923330"/>
           </a:xfrm>
           <a:prstGeom prst="rect">
@@ -3053,7 +3053,7 @@
         </p:nvSpPr>
         <p:spPr>
           <a:xfrm>
-            <a:off x="3402330" y="1197649"/>
+            <a:off x="2842260" y="1197649"/>
             <a:ext cx="1867306" cy="1200329"/>
           </a:xfrm>
           <a:prstGeom prst="rect">
@@ -3120,7 +3120,7 @@
         </p:nvSpPr>
         <p:spPr>
           <a:xfrm>
-            <a:off x="738120" y="2883663"/>
+            <a:off x="555240" y="2883663"/>
             <a:ext cx="1213794" cy="646331"/>
           </a:xfrm>
           <a:prstGeom prst="rect">
@@ -3174,7 +3174,7 @@
         </p:nvSpPr>
         <p:spPr>
           <a:xfrm>
-            <a:off x="3482929" y="2907684"/>
+            <a:off x="2922859" y="2907684"/>
             <a:ext cx="1706108" cy="646331"/>
           </a:xfrm>
           <a:prstGeom prst="rect">
@@ -3228,7 +3228,7 @@
         </p:nvSpPr>
         <p:spPr>
           <a:xfrm>
-            <a:off x="3631303" y="4370724"/>
+            <a:off x="3071233" y="4370724"/>
             <a:ext cx="1409360" cy="646331"/>
           </a:xfrm>
           <a:prstGeom prst="rect">
@@ -3284,7 +3284,7 @@
         </p:nvCxnSpPr>
         <p:spPr>
           <a:xfrm>
-            <a:off x="1345018" y="2352258"/>
+            <a:off x="1162138" y="2352258"/>
             <a:ext cx="0" cy="485685"/>
           </a:xfrm>
           <a:prstGeom prst="straightConnector1">
@@ -3328,7 +3328,7 @@
         </p:nvCxnSpPr>
         <p:spPr>
           <a:xfrm>
-            <a:off x="4335983" y="2468881"/>
+            <a:off x="3775913" y="2468881"/>
             <a:ext cx="0" cy="404513"/>
           </a:xfrm>
           <a:prstGeom prst="straightConnector1">
@@ -3372,7 +3372,7 @@
         </p:nvCxnSpPr>
         <p:spPr>
           <a:xfrm>
-            <a:off x="4335983" y="3646170"/>
+            <a:off x="3775913" y="3646170"/>
             <a:ext cx="0" cy="640080"/>
           </a:xfrm>
           <a:prstGeom prst="straightConnector1">
@@ -3411,16 +3411,20 @@
           </p:cNvPr>
           <p:cNvCxnSpPr>
             <a:cxnSpLocks/>
+            <a:stCxn id="7" idx="3"/>
+            <a:endCxn id="9" idx="1"/>
           </p:cNvCxnSpPr>
           <p:nvPr/>
         </p:nvCxnSpPr>
         <p:spPr>
           <a:xfrm>
-            <a:off x="2046944" y="3206828"/>
-            <a:ext cx="1504565" cy="1487060"/>
+            <a:off x="1769034" y="3206829"/>
+            <a:ext cx="1302199" cy="1487061"/>
           </a:xfrm>
           <a:prstGeom prst="bentConnector3">
-            <a:avLst/>
+            <a:avLst>
+              <a:gd name="adj1" fmla="val 50000"/>
+            </a:avLst>
           </a:prstGeom>
           <a:ln w="28575">
             <a:solidFill>
@@ -3458,7 +3462,7 @@
         </p:nvSpPr>
         <p:spPr>
           <a:xfrm>
-            <a:off x="655565" y="4286251"/>
+            <a:off x="472685" y="4286251"/>
             <a:ext cx="1378904" cy="646331"/>
           </a:xfrm>
           <a:prstGeom prst="rect">
@@ -3511,7 +3515,7 @@
         </p:nvSpPr>
         <p:spPr>
           <a:xfrm>
-            <a:off x="3646531" y="5556765"/>
+            <a:off x="3086461" y="5556765"/>
             <a:ext cx="1378904" cy="646331"/>
           </a:xfrm>
           <a:prstGeom prst="rect">
@@ -3564,7 +3568,7 @@
         </p:nvSpPr>
         <p:spPr>
           <a:xfrm>
-            <a:off x="738120" y="5556766"/>
+            <a:off x="555240" y="5556766"/>
             <a:ext cx="1210588" cy="646331"/>
           </a:xfrm>
           <a:prstGeom prst="rect">
@@ -3619,7 +3623,7 @@
         </p:nvCxnSpPr>
         <p:spPr>
           <a:xfrm>
-            <a:off x="1345017" y="3646170"/>
+            <a:off x="1162137" y="3646170"/>
             <a:ext cx="0" cy="582930"/>
           </a:xfrm>
           <a:prstGeom prst="straightConnector1">
@@ -3663,7 +3667,7 @@
         </p:nvCxnSpPr>
         <p:spPr>
           <a:xfrm>
-            <a:off x="1343414" y="5029201"/>
+            <a:off x="1160534" y="5029201"/>
             <a:ext cx="0" cy="458985"/>
           </a:xfrm>
           <a:prstGeom prst="straightConnector1">
@@ -3707,7 +3711,7 @@
         </p:nvCxnSpPr>
         <p:spPr>
           <a:xfrm>
-            <a:off x="4335983" y="5132070"/>
+            <a:off x="3775913" y="5132070"/>
             <a:ext cx="0" cy="401834"/>
           </a:xfrm>
           <a:prstGeom prst="straightConnector1">
@@ -3735,48 +3739,6 @@
           </a:fontRef>
         </p:style>
       </p:cxnSp>
-      <p:cxnSp>
-        <p:nvCxnSpPr>
-          <p:cNvPr id="45" name="Straight Arrow Connector 44">
-            <a:extLst>
-              <a:ext uri="{FF2B5EF4-FFF2-40B4-BE49-F238E27FC236}">
-                <a16:creationId xmlns:a16="http://schemas.microsoft.com/office/drawing/2014/main" id="{C3836C16-C58C-7E4C-BE9A-D4F1665B6CE6}"/>
-              </a:ext>
-            </a:extLst>
-          </p:cNvPr>
-          <p:cNvCxnSpPr/>
-          <p:nvPr/>
-        </p:nvCxnSpPr>
-        <p:spPr>
-          <a:xfrm flipH="1">
-            <a:off x="2046944" y="5017054"/>
-            <a:ext cx="1435985" cy="766526"/>
-          </a:xfrm>
-          <a:prstGeom prst="straightConnector1">
-            <a:avLst/>
-          </a:prstGeom>
-          <a:ln w="28575">
-            <a:solidFill>
-              <a:schemeClr val="accent1"/>
-            </a:solidFill>
-            <a:tailEnd type="triangle"/>
-          </a:ln>
-        </p:spPr>
-        <p:style>
-          <a:lnRef idx="1">
-            <a:schemeClr val="accent1"/>
-          </a:lnRef>
-          <a:fillRef idx="0">
-            <a:schemeClr val="accent1"/>
-          </a:fillRef>
-          <a:effectRef idx="0">
-            <a:schemeClr val="accent1"/>
-          </a:effectRef>
-          <a:fontRef idx="minor">
-            <a:schemeClr val="tx1"/>
-          </a:fontRef>
-        </p:style>
-      </p:cxnSp>
       <p:sp>
         <p:nvSpPr>
           <p:cNvPr id="51" name="TextBox 50">
@@ -3834,7 +3796,7 @@
         </p:nvSpPr>
         <p:spPr>
           <a:xfrm>
-            <a:off x="5806440" y="1940776"/>
+            <a:off x="5577840" y="786346"/>
             <a:ext cx="679994" cy="646331"/>
           </a:xfrm>
           <a:prstGeom prst="rect">
@@ -3887,7 +3849,7 @@
         </p:nvSpPr>
         <p:spPr>
           <a:xfrm>
-            <a:off x="5695031" y="2906700"/>
+            <a:off x="5466431" y="1752270"/>
             <a:ext cx="902811" cy="646331"/>
           </a:xfrm>
           <a:prstGeom prst="rect">
@@ -3940,7 +3902,7 @@
         </p:nvSpPr>
         <p:spPr>
           <a:xfrm>
-            <a:off x="5733502" y="3893789"/>
+            <a:off x="5504902" y="2739359"/>
             <a:ext cx="825867" cy="646331"/>
           </a:xfrm>
           <a:prstGeom prst="rect">
@@ -3993,7 +3955,7 @@
         </p:nvSpPr>
         <p:spPr>
           <a:xfrm>
-            <a:off x="5646420" y="1520190"/>
+            <a:off x="5417820" y="365760"/>
             <a:ext cx="581378" cy="369332"/>
           </a:xfrm>
           <a:prstGeom prst="rect">
@@ -4028,7 +3990,7 @@
         </p:nvSpPr>
         <p:spPr>
           <a:xfrm>
-            <a:off x="5608820" y="1520190"/>
+            <a:off x="5380220" y="365760"/>
             <a:ext cx="1100590" cy="3173698"/>
           </a:xfrm>
           <a:prstGeom prst="rect">
@@ -4066,6 +4028,97 @@
           </a:p>
         </p:txBody>
       </p:sp>
+      <p:sp>
+        <p:nvSpPr>
+          <p:cNvPr id="4" name="TextBox 3">
+            <a:extLst>
+              <a:ext uri="{FF2B5EF4-FFF2-40B4-BE49-F238E27FC236}">
+                <a16:creationId xmlns:a16="http://schemas.microsoft.com/office/drawing/2014/main" id="{EA67FE26-8259-2E4D-BB7B-C71F954B1103}"/>
+              </a:ext>
+            </a:extLst>
+          </p:cNvPr>
+          <p:cNvSpPr txBox="1"/>
+          <p:nvPr/>
+        </p:nvSpPr>
+        <p:spPr>
+          <a:xfrm>
+            <a:off x="4717185" y="5070631"/>
+            <a:ext cx="2011680" cy="1200329"/>
+          </a:xfrm>
+          <a:prstGeom prst="rect">
+            <a:avLst/>
+          </a:prstGeom>
+          <a:solidFill>
+            <a:schemeClr val="accent5">
+              <a:lumMod val="40000"/>
+              <a:lumOff val="60000"/>
+            </a:schemeClr>
+          </a:solidFill>
+          <a:ln w="28575">
+            <a:solidFill>
+              <a:schemeClr val="accent1"/>
+            </a:solidFill>
+          </a:ln>
+        </p:spPr>
+        <p:txBody>
+          <a:bodyPr wrap="square" rtlCol="0">
+            <a:spAutoFit/>
+          </a:bodyPr>
+          <a:lstStyle/>
+          <a:p>
+            <a:pPr algn="ctr"/>
+            <a:r>
+              <a:rPr lang="en-US" dirty="0"/>
+              <a:t>Time Series Fit Input File (flags for what type of fit to perform)</a:t>
+            </a:r>
+          </a:p>
+        </p:txBody>
+      </p:sp>
+      <p:cxnSp>
+        <p:nvCxnSpPr>
+          <p:cNvPr id="14" name="Elbow Connector 13">
+            <a:extLst>
+              <a:ext uri="{FF2B5EF4-FFF2-40B4-BE49-F238E27FC236}">
+                <a16:creationId xmlns:a16="http://schemas.microsoft.com/office/drawing/2014/main" id="{A7B5E6CB-B9C4-0A47-B5F9-01E50BC8D3BE}"/>
+              </a:ext>
+            </a:extLst>
+          </p:cNvPr>
+          <p:cNvCxnSpPr>
+            <a:stCxn id="4" idx="0"/>
+            <a:endCxn id="9" idx="3"/>
+          </p:cNvCxnSpPr>
+          <p:nvPr/>
+        </p:nvCxnSpPr>
+        <p:spPr>
+          <a:xfrm rot="16200000" flipV="1">
+            <a:off x="4913439" y="4261045"/>
+            <a:ext cx="376741" cy="1242432"/>
+          </a:xfrm>
+          <a:prstGeom prst="bentConnector2">
+            <a:avLst/>
+          </a:prstGeom>
+          <a:ln w="28575">
+            <a:solidFill>
+              <a:schemeClr val="accent1"/>
+            </a:solidFill>
+            <a:tailEnd type="triangle"/>
+          </a:ln>
+        </p:spPr>
+        <p:style>
+          <a:lnRef idx="1">
+            <a:schemeClr val="accent1"/>
+          </a:lnRef>
+          <a:fillRef idx="0">
+            <a:schemeClr val="accent1"/>
+          </a:fillRef>
+          <a:effectRef idx="0">
+            <a:schemeClr val="accent1"/>
+          </a:effectRef>
+          <a:fontRef idx="minor">
+            <a:schemeClr val="tx1"/>
+          </a:fontRef>
+        </p:style>
+      </p:cxnSp>
     </p:spTree>
     <p:extLst>
       <p:ext uri="{BB962C8B-B14F-4D97-AF65-F5344CB8AC3E}">

</xml_diff>